<commit_message>
added Specifiation intial from Vikram
</commit_message>
<xml_diff>
--- a/ITech_GP.pptx
+++ b/ITech_GP.pptx
@@ -16689,225 +16689,72 @@
       </p:sp>
       <p:sp>
         <p:nvSpPr>
-          <p:cNvPr id="14" name="Text Placeholder 13">
-            <a:extLst>
-              <a:ext uri="{FF2B5EF4-FFF2-40B4-BE49-F238E27FC236}">
-                <a16:creationId xmlns:a16="http://schemas.microsoft.com/office/drawing/2014/main" id="{61A6601B-A3E2-47A2-B731-4FE03C43E2B0}"/>
-              </a:ext>
-            </a:extLst>
-          </p:cNvPr>
-          <p:cNvSpPr>
-            <a:spLocks noGrp="1"/>
-          </p:cNvSpPr>
-          <p:nvPr>
-            <p:ph type="body" sz="quarter" idx="14"/>
-          </p:nvPr>
-        </p:nvSpPr>
-        <p:spPr>
-          <a:xfrm>
-            <a:off x="1209243" y="1764139"/>
-            <a:ext cx="4756714" cy="597604"/>
+          <p:cNvPr id="7" name="Footer Placeholder 6">
+            <a:extLst>
+              <a:ext uri="{FF2B5EF4-FFF2-40B4-BE49-F238E27FC236}">
+                <a16:creationId xmlns:a16="http://schemas.microsoft.com/office/drawing/2014/main" id="{C4A3939E-B573-4FB2-AD69-18C1A75F947B}"/>
+              </a:ext>
+            </a:extLst>
+          </p:cNvPr>
+          <p:cNvSpPr>
+            <a:spLocks noGrp="1"/>
+          </p:cNvSpPr>
+          <p:nvPr>
+            <p:ph type="ftr" sz="quarter" idx="11"/>
+          </p:nvPr>
+        </p:nvSpPr>
+        <p:spPr>
+          <a:xfrm>
+            <a:off x="201168" y="6356350"/>
+            <a:ext cx="4837176" cy="365125"/>
           </a:xfrm>
         </p:spPr>
         <p:txBody>
           <a:bodyPr rtlCol="0"/>
           <a:lstStyle/>
           <a:p>
-            <a:pPr rtl="0"/>
+            <a:pPr lvl="0" rtl="0"/>
+            <a:r>
+              <a:rPr lang="en-GB" dirty="0" err="1"/>
+              <a:t>Simplify’s</a:t>
+            </a:r>
             <a:r>
               <a:rPr lang="en-GB" dirty="0"/>
-              <a:t>Subtitle</a:t>
-            </a:r>
-          </a:p>
-        </p:txBody>
-      </p:sp>
-      <p:sp>
-        <p:nvSpPr>
-          <p:cNvPr id="13" name="Content Placeholder 12">
-            <a:extLst>
-              <a:ext uri="{FF2B5EF4-FFF2-40B4-BE49-F238E27FC236}">
-                <a16:creationId xmlns:a16="http://schemas.microsoft.com/office/drawing/2014/main" id="{ABAEE544-8FB3-4E56-91A9-A6964539DCB7}"/>
-              </a:ext>
-            </a:extLst>
-          </p:cNvPr>
-          <p:cNvSpPr>
-            <a:spLocks noGrp="1"/>
-          </p:cNvSpPr>
-          <p:nvPr>
-            <p:ph type="body" sz="quarter" idx="17"/>
-          </p:nvPr>
-        </p:nvSpPr>
-        <p:spPr>
-          <a:xfrm>
-            <a:off x="1209243" y="2374900"/>
-            <a:ext cx="4756714" cy="3365500"/>
+              <a:t> Design Specification</a:t>
+            </a:r>
+          </a:p>
+        </p:txBody>
+      </p:sp>
+      <p:sp>
+        <p:nvSpPr>
+          <p:cNvPr id="6" name="Date Placeholder 5">
+            <a:extLst>
+              <a:ext uri="{FF2B5EF4-FFF2-40B4-BE49-F238E27FC236}">
+                <a16:creationId xmlns:a16="http://schemas.microsoft.com/office/drawing/2014/main" id="{6EF65B39-4112-473E-B203-73AC0F564D47}"/>
+              </a:ext>
+            </a:extLst>
+          </p:cNvPr>
+          <p:cNvSpPr>
+            <a:spLocks noGrp="1"/>
+          </p:cNvSpPr>
+          <p:nvPr>
+            <p:ph type="dt" sz="half" idx="10"/>
+          </p:nvPr>
+        </p:nvSpPr>
+        <p:spPr>
+          <a:xfrm>
+            <a:off x="7013448" y="6355080"/>
+            <a:ext cx="4352544" cy="365125"/>
           </a:xfrm>
         </p:spPr>
         <p:txBody>
           <a:bodyPr rtlCol="0"/>
           <a:lstStyle/>
           <a:p>
-            <a:pPr rtl="0"/>
+            <a:pPr lvl="0" rtl="0"/>
             <a:r>
               <a:rPr lang="en-GB" dirty="0"/>
-              <a:t>Add text, images, art, and videos. </a:t>
-            </a:r>
-          </a:p>
-          <a:p>
-            <a:pPr rtl="0"/>
-            <a:r>
-              <a:rPr lang="en-GB" dirty="0"/>
-              <a:t>Add transitions, animations, and motion. </a:t>
-            </a:r>
-          </a:p>
-          <a:p>
-            <a:pPr rtl="0"/>
-            <a:r>
-              <a:rPr lang="en-GB" dirty="0"/>
-              <a:t>Save to OneDrive, to get to your presentations from your computer, tablet, or phone. </a:t>
-            </a:r>
-          </a:p>
-        </p:txBody>
-      </p:sp>
-      <p:sp>
-        <p:nvSpPr>
-          <p:cNvPr id="16" name="Text Placeholder 15">
-            <a:extLst>
-              <a:ext uri="{FF2B5EF4-FFF2-40B4-BE49-F238E27FC236}">
-                <a16:creationId xmlns:a16="http://schemas.microsoft.com/office/drawing/2014/main" id="{1ADD5DF7-575E-4C10-815E-CDBBFAB583BF}"/>
-              </a:ext>
-            </a:extLst>
-          </p:cNvPr>
-          <p:cNvSpPr>
-            <a:spLocks noGrp="1"/>
-          </p:cNvSpPr>
-          <p:nvPr>
-            <p:ph type="body" sz="quarter" idx="16"/>
-          </p:nvPr>
-        </p:nvSpPr>
-        <p:spPr>
-          <a:xfrm>
-            <a:off x="6257467" y="1764031"/>
-            <a:ext cx="4756714" cy="597604"/>
-          </a:xfrm>
-        </p:spPr>
-        <p:txBody>
-          <a:bodyPr rtlCol="0"/>
-          <a:lstStyle/>
-          <a:p>
-            <a:pPr rtl="0"/>
-            <a:r>
-              <a:rPr lang="en-GB" dirty="0"/>
-              <a:t>Subtitle</a:t>
-            </a:r>
-          </a:p>
-        </p:txBody>
-      </p:sp>
-      <p:sp>
-        <p:nvSpPr>
-          <p:cNvPr id="15" name="Content Placeholder 14">
-            <a:extLst>
-              <a:ext uri="{FF2B5EF4-FFF2-40B4-BE49-F238E27FC236}">
-                <a16:creationId xmlns:a16="http://schemas.microsoft.com/office/drawing/2014/main" id="{A13BE1C0-386B-47CB-BDCE-A24D9918AEEF}"/>
-              </a:ext>
-            </a:extLst>
-          </p:cNvPr>
-          <p:cNvSpPr>
-            <a:spLocks noGrp="1"/>
-          </p:cNvSpPr>
-          <p:nvPr>
-            <p:ph type="body" sz="quarter" idx="18"/>
-          </p:nvPr>
-        </p:nvSpPr>
-        <p:spPr>
-          <a:xfrm>
-            <a:off x="6257467" y="2374900"/>
-            <a:ext cx="4756714" cy="3365500"/>
-          </a:xfrm>
-        </p:spPr>
-        <p:txBody>
-          <a:bodyPr rtlCol="0"/>
-          <a:lstStyle/>
-          <a:p>
-            <a:pPr rtl="0"/>
-            <a:r>
-              <a:rPr lang="en-GB" dirty="0"/>
-              <a:t>Open the Design Ideas pane for instant slide makeovers. </a:t>
-            </a:r>
-          </a:p>
-          <a:p>
-            <a:pPr rtl="0"/>
-            <a:r>
-              <a:rPr lang="en-GB" dirty="0"/>
-              <a:t>When we have design ideas, we’ll show them to you right there. </a:t>
-            </a:r>
-          </a:p>
-        </p:txBody>
-      </p:sp>
-      <p:sp>
-        <p:nvSpPr>
-          <p:cNvPr id="7" name="Footer Placeholder 6">
-            <a:extLst>
-              <a:ext uri="{FF2B5EF4-FFF2-40B4-BE49-F238E27FC236}">
-                <a16:creationId xmlns:a16="http://schemas.microsoft.com/office/drawing/2014/main" id="{C4A3939E-B573-4FB2-AD69-18C1A75F947B}"/>
-              </a:ext>
-            </a:extLst>
-          </p:cNvPr>
-          <p:cNvSpPr>
-            <a:spLocks noGrp="1"/>
-          </p:cNvSpPr>
-          <p:nvPr>
-            <p:ph type="ftr" sz="quarter" idx="11"/>
-          </p:nvPr>
-        </p:nvSpPr>
-        <p:spPr>
-          <a:xfrm>
-            <a:off x="201168" y="6356350"/>
-            <a:ext cx="4837176" cy="365125"/>
-          </a:xfrm>
-        </p:spPr>
-        <p:txBody>
-          <a:bodyPr rtlCol="0"/>
-          <a:lstStyle/>
-          <a:p>
-            <a:pPr lvl="0" rtl="0"/>
-            <a:r>
-              <a:rPr lang="en-GB"/>
-              <a:t>Presentation title</a:t>
-            </a:r>
-          </a:p>
-        </p:txBody>
-      </p:sp>
-      <p:sp>
-        <p:nvSpPr>
-          <p:cNvPr id="6" name="Date Placeholder 5">
-            <a:extLst>
-              <a:ext uri="{FF2B5EF4-FFF2-40B4-BE49-F238E27FC236}">
-                <a16:creationId xmlns:a16="http://schemas.microsoft.com/office/drawing/2014/main" id="{6EF65B39-4112-473E-B203-73AC0F564D47}"/>
-              </a:ext>
-            </a:extLst>
-          </p:cNvPr>
-          <p:cNvSpPr>
-            <a:spLocks noGrp="1"/>
-          </p:cNvSpPr>
-          <p:nvPr>
-            <p:ph type="dt" sz="half" idx="10"/>
-          </p:nvPr>
-        </p:nvSpPr>
-        <p:spPr>
-          <a:xfrm>
-            <a:off x="7013448" y="6355080"/>
-            <a:ext cx="4352544" cy="365125"/>
-          </a:xfrm>
-        </p:spPr>
-        <p:txBody>
-          <a:bodyPr rtlCol="0"/>
-          <a:lstStyle/>
-          <a:p>
-            <a:pPr lvl="0" rtl="0"/>
-            <a:r>
-              <a:rPr lang="en-GB"/>
-              <a:t>20XX</a:t>
+              <a:t>2023</a:t>
             </a:r>
           </a:p>
         </p:txBody>
@@ -16945,6 +16792,105 @@
               <a:t>5</a:t>
             </a:fld>
             <a:endParaRPr lang="en-GB"/>
+          </a:p>
+        </p:txBody>
+      </p:sp>
+      <p:sp>
+        <p:nvSpPr>
+          <p:cNvPr id="18" name="TextBox 17">
+            <a:extLst>
+              <a:ext uri="{FF2B5EF4-FFF2-40B4-BE49-F238E27FC236}">
+                <a16:creationId xmlns:a16="http://schemas.microsoft.com/office/drawing/2014/main" id="{2A11F454-C1DE-9EA7-DA63-CF7DA1837D1B}"/>
+              </a:ext>
+            </a:extLst>
+          </p:cNvPr>
+          <p:cNvSpPr txBox="1"/>
+          <p:nvPr/>
+        </p:nvSpPr>
+        <p:spPr>
+          <a:xfrm>
+            <a:off x="167816" y="1182330"/>
+            <a:ext cx="11823016" cy="5355312"/>
+          </a:xfrm>
+          <a:prstGeom prst="rect">
+            <a:avLst/>
+          </a:prstGeom>
+          <a:noFill/>
+        </p:spPr>
+        <p:txBody>
+          <a:bodyPr wrap="square">
+            <a:spAutoFit/>
+          </a:bodyPr>
+          <a:lstStyle/>
+          <a:p>
+            <a:pPr rtl="0"/>
+            <a:r>
+              <a:rPr lang="en-GB" dirty="0"/>
+              <a:t>User authentication: The platform should provide the users; students and tutors a management system to login or register using google or a registration form. The user should be able to register as a student or a tutor.</a:t>
+            </a:r>
+          </a:p>
+          <a:p>
+            <a:pPr rtl="0"/>
+            <a:r>
+              <a:rPr lang="en-GB" dirty="0"/>
+              <a:t>User based dashboard: The platform should distinguish between a tutor and a student, with access being given to the student for only the student specific pages.</a:t>
+            </a:r>
+          </a:p>
+          <a:p>
+            <a:pPr rtl="0"/>
+            <a:endParaRPr lang="en-GB" dirty="0"/>
+          </a:p>
+          <a:p>
+            <a:pPr rtl="0"/>
+            <a:r>
+              <a:rPr lang="en-GB" dirty="0"/>
+              <a:t>Course management: The platform should have a user-friendly environment that allows the tutors to create a course, add pre-existing courses, and publish course materials including slides, pdfs, images and videos.</a:t>
+            </a:r>
+          </a:p>
+          <a:p>
+            <a:pPr rtl="0"/>
+            <a:endParaRPr lang="en-GB" dirty="0"/>
+          </a:p>
+          <a:p>
+            <a:pPr rtl="0"/>
+            <a:r>
+              <a:rPr lang="en-GB" dirty="0"/>
+              <a:t>Course accessibility: The platform should provide the student access to view all the course material and submit course work.</a:t>
+            </a:r>
+          </a:p>
+          <a:p>
+            <a:pPr rtl="0"/>
+            <a:endParaRPr lang="en-GB" dirty="0"/>
+          </a:p>
+          <a:p>
+            <a:pPr rtl="0"/>
+            <a:r>
+              <a:rPr lang="en-GB" dirty="0"/>
+              <a:t>Personalization: The platform should provide the student the option to enrol for more than 1 course at a time and track the progress of each course.</a:t>
+            </a:r>
+          </a:p>
+          <a:p>
+            <a:pPr rtl="0"/>
+            <a:endParaRPr lang="en-GB" dirty="0"/>
+          </a:p>
+          <a:p>
+            <a:pPr rtl="0"/>
+            <a:r>
+              <a:rPr lang="en-GB" dirty="0"/>
+              <a:t>Interactive learning: The courses within the platform should include various tools for learning such as forums for posting questions and a blog with an overview of the course.</a:t>
+            </a:r>
+          </a:p>
+          <a:p>
+            <a:pPr rtl="0"/>
+            <a:endParaRPr lang="en-GB" dirty="0"/>
+          </a:p>
+          <a:p>
+            <a:pPr rtl="0"/>
+            <a:endParaRPr lang="en-GB" dirty="0"/>
+          </a:p>
+          <a:p>
+            <a:pPr rtl="0"/>
+            <a:endParaRPr lang="en-GB" dirty="0"/>
           </a:p>
         </p:txBody>
       </p:sp>
@@ -18973,6 +18919,25 @@
 </file>
 
 <file path=customXml/item1.xml><?xml version="1.0" encoding="utf-8"?>
+<p:properties xmlns:p="http://schemas.microsoft.com/office/2006/metadata/properties" xmlns:xsi="http://www.w3.org/2001/XMLSchema-instance" xmlns:pc="http://schemas.microsoft.com/office/infopath/2007/PartnerControls">
+  <documentManagement>
+    <Status xmlns="71af3243-3dd4-4a8d-8c0d-dd76da1f02a5">Not started</Status>
+    <_ip_UnifiedCompliancePolicyUIAction xmlns="http://schemas.microsoft.com/sharepoint/v3" xsi:nil="true"/>
+    <Image xmlns="71af3243-3dd4-4a8d-8c0d-dd76da1f02a5">
+      <Url xsi:nil="true"/>
+      <Description xsi:nil="true"/>
+    </Image>
+    <_ip_UnifiedCompliancePolicyProperties xmlns="http://schemas.microsoft.com/sharepoint/v3" xsi:nil="true"/>
+    <ImageTagsTaxHTField xmlns="71af3243-3dd4-4a8d-8c0d-dd76da1f02a5">
+      <Terms xmlns="http://schemas.microsoft.com/office/infopath/2007/PartnerControls"/>
+    </ImageTagsTaxHTField>
+    <TaxCatchAll xmlns="230e9df3-be65-4c73-a93b-d1236ebd677e"/>
+    <MediaServiceKeyPoints xmlns="71af3243-3dd4-4a8d-8c0d-dd76da1f02a5" xsi:nil="true"/>
+  </documentManagement>
+</p:properties>
+</file>
+
+<file path=customXml/item2.xml><?xml version="1.0" encoding="utf-8"?>
 <ct:contentTypeSchema xmlns:ct="http://schemas.microsoft.com/office/2006/metadata/contentType" xmlns:ma="http://schemas.microsoft.com/office/2006/metadata/properties/metaAttributes" ct:_="" ma:_="" ma:contentTypeName="Document" ma:contentTypeID="0x01010079F111ED35F8CC479449609E8A0923A6" ma:contentTypeVersion="20" ma:contentTypeDescription="Create a new document." ma:contentTypeScope="" ma:versionID="1267097ee5f5874adfcc408041ae252e">
   <xsd:schema xmlns:xsd="http://www.w3.org/2001/XMLSchema" xmlns:xs="http://www.w3.org/2001/XMLSchema" xmlns:p="http://schemas.microsoft.com/office/2006/metadata/properties" xmlns:ns1="http://schemas.microsoft.com/sharepoint/v3" xmlns:ns2="71af3243-3dd4-4a8d-8c0d-dd76da1f02a5" xmlns:ns3="16c05727-aa75-4e4a-9b5f-8a80a1165891" xmlns:ns4="230e9df3-be65-4c73-a93b-d1236ebd677e" targetNamespace="http://schemas.microsoft.com/office/2006/metadata/properties" ma:root="true" ma:fieldsID="395891a93df65b14727750f2c06c306c" ns1:_="" ns2:_="" ns3:_="" ns4:_="">
     <xsd:import namespace="http://schemas.microsoft.com/sharepoint/v3"/>
@@ -19248,25 +19213,6 @@
 </ct:contentTypeSchema>
 </file>
 
-<file path=customXml/item2.xml><?xml version="1.0" encoding="utf-8"?>
-<p:properties xmlns:p="http://schemas.microsoft.com/office/2006/metadata/properties" xmlns:xsi="http://www.w3.org/2001/XMLSchema-instance" xmlns:pc="http://schemas.microsoft.com/office/infopath/2007/PartnerControls">
-  <documentManagement>
-    <Status xmlns="71af3243-3dd4-4a8d-8c0d-dd76da1f02a5">Not started</Status>
-    <_ip_UnifiedCompliancePolicyUIAction xmlns="http://schemas.microsoft.com/sharepoint/v3" xsi:nil="true"/>
-    <Image xmlns="71af3243-3dd4-4a8d-8c0d-dd76da1f02a5">
-      <Url xsi:nil="true"/>
-      <Description xsi:nil="true"/>
-    </Image>
-    <_ip_UnifiedCompliancePolicyProperties xmlns="http://schemas.microsoft.com/sharepoint/v3" xsi:nil="true"/>
-    <ImageTagsTaxHTField xmlns="71af3243-3dd4-4a8d-8c0d-dd76da1f02a5">
-      <Terms xmlns="http://schemas.microsoft.com/office/infopath/2007/PartnerControls"/>
-    </ImageTagsTaxHTField>
-    <TaxCatchAll xmlns="230e9df3-be65-4c73-a93b-d1236ebd677e"/>
-    <MediaServiceKeyPoints xmlns="71af3243-3dd4-4a8d-8c0d-dd76da1f02a5" xsi:nil="true"/>
-  </documentManagement>
-</p:properties>
-</file>
-
 <file path=customXml/item3.xml><?xml version="1.0" encoding="utf-8"?>
 <?mso-contentType ?>
 <FormTemplates xmlns="http://schemas.microsoft.com/sharepoint/v3/contenttype/forms">
@@ -19277,6 +19223,18 @@
 </file>
 
 <file path=customXml/itemProps1.xml><?xml version="1.0" encoding="utf-8"?>
+<ds:datastoreItem xmlns:ds="http://schemas.openxmlformats.org/officeDocument/2006/customXml" ds:itemID="{08757C30-AE9A-4680-90EB-19D282EC2B7C}">
+  <ds:schemaRefs>
+    <ds:schemaRef ds:uri="http://schemas.microsoft.com/office/2006/metadata/properties"/>
+    <ds:schemaRef ds:uri="http://schemas.microsoft.com/office/infopath/2007/PartnerControls"/>
+    <ds:schemaRef ds:uri="71af3243-3dd4-4a8d-8c0d-dd76da1f02a5"/>
+    <ds:schemaRef ds:uri="http://schemas.microsoft.com/sharepoint/v3"/>
+    <ds:schemaRef ds:uri="230e9df3-be65-4c73-a93b-d1236ebd677e"/>
+  </ds:schemaRefs>
+</ds:datastoreItem>
+</file>
+
+<file path=customXml/itemProps2.xml><?xml version="1.0" encoding="utf-8"?>
 <ds:datastoreItem xmlns:ds="http://schemas.openxmlformats.org/officeDocument/2006/customXml" ds:itemID="{0AF0BF08-C674-44E3-8BFC-85BC65E095F1}">
   <ds:schemaRefs>
     <ds:schemaRef ds:uri="http://schemas.microsoft.com/office/2006/metadata/contentType"/>
@@ -19297,18 +19255,6 @@
 </ds:datastoreItem>
 </file>
 
-<file path=customXml/itemProps2.xml><?xml version="1.0" encoding="utf-8"?>
-<ds:datastoreItem xmlns:ds="http://schemas.openxmlformats.org/officeDocument/2006/customXml" ds:itemID="{08757C30-AE9A-4680-90EB-19D282EC2B7C}">
-  <ds:schemaRefs>
-    <ds:schemaRef ds:uri="http://schemas.microsoft.com/office/2006/metadata/properties"/>
-    <ds:schemaRef ds:uri="http://schemas.microsoft.com/office/infopath/2007/PartnerControls"/>
-    <ds:schemaRef ds:uri="71af3243-3dd4-4a8d-8c0d-dd76da1f02a5"/>
-    <ds:schemaRef ds:uri="http://schemas.microsoft.com/sharepoint/v3"/>
-    <ds:schemaRef ds:uri="230e9df3-be65-4c73-a93b-d1236ebd677e"/>
-  </ds:schemaRefs>
-</ds:datastoreItem>
-</file>
-
 <file path=customXml/itemProps3.xml><?xml version="1.0" encoding="utf-8"?>
 <ds:datastoreItem xmlns:ds="http://schemas.openxmlformats.org/officeDocument/2006/customXml" ds:itemID="{A5CCB28C-7D26-4A36-9CFC-D739C28F3D18}">
   <ds:schemaRefs>

</xml_diff>